<commit_message>
Exam review slided updated
</commit_message>
<xml_diff>
--- a/Slides/Slides-PPT/Exam 1 - Review A.pptx
+++ b/Slides/Slides-PPT/Exam 1 - Review A.pptx
@@ -223,7 +223,7 @@
           <a:p>
             <a:fld id="{43386AF1-EF24-4659-9089-2771856A9EA2}" type="datetimeFigureOut">
               <a:rPr lang="en-US" smtClean="0"/>
-              <a:t>2/18/2022</a:t>
+              <a:t>10/11/2022</a:t>
             </a:fld>
             <a:endParaRPr lang="en-US"/>
           </a:p>
@@ -4431,7 +4431,7 @@
           <a:p>
             <a:fld id="{F8616885-9ED8-4298-9149-C5A410E7F61A}" type="datetime1">
               <a:rPr lang="en-US" smtClean="0"/>
-              <a:t>2/18/2022</a:t>
+              <a:t>10/11/2022</a:t>
             </a:fld>
             <a:endParaRPr lang="en-US"/>
           </a:p>
@@ -4601,7 +4601,7 @@
           <a:p>
             <a:fld id="{46647952-6535-4065-B4F6-C94B3D00772F}" type="datetime1">
               <a:rPr lang="en-US" smtClean="0"/>
-              <a:t>2/18/2022</a:t>
+              <a:t>10/11/2022</a:t>
             </a:fld>
             <a:endParaRPr lang="en-US"/>
           </a:p>
@@ -4781,7 +4781,7 @@
           <a:p>
             <a:fld id="{63870D39-F97D-4ECC-909C-35255E9A37F7}" type="datetime1">
               <a:rPr lang="en-US" smtClean="0"/>
-              <a:t>2/18/2022</a:t>
+              <a:t>10/11/2022</a:t>
             </a:fld>
             <a:endParaRPr lang="en-US"/>
           </a:p>
@@ -4973,7 +4973,7 @@
           <a:p>
             <a:fld id="{38C9C2D7-406E-45EE-9F57-B83131B49240}" type="datetimeFigureOut">
               <a:rPr lang="en-US" smtClean="0"/>
-              <a:t>2/18/2022</a:t>
+              <a:t>10/11/2022</a:t>
             </a:fld>
             <a:endParaRPr lang="en-US"/>
           </a:p>
@@ -5143,7 +5143,7 @@
           <a:p>
             <a:fld id="{38C9C2D7-406E-45EE-9F57-B83131B49240}" type="datetimeFigureOut">
               <a:rPr lang="en-US" smtClean="0"/>
-              <a:t>2/18/2022</a:t>
+              <a:t>10/11/2022</a:t>
             </a:fld>
             <a:endParaRPr lang="en-US"/>
           </a:p>
@@ -5389,7 +5389,7 @@
           <a:p>
             <a:fld id="{38C9C2D7-406E-45EE-9F57-B83131B49240}" type="datetimeFigureOut">
               <a:rPr lang="en-US" smtClean="0"/>
-              <a:t>2/18/2022</a:t>
+              <a:t>10/11/2022</a:t>
             </a:fld>
             <a:endParaRPr lang="en-US"/>
           </a:p>
@@ -5621,7 +5621,7 @@
           <a:p>
             <a:fld id="{38C9C2D7-406E-45EE-9F57-B83131B49240}" type="datetimeFigureOut">
               <a:rPr lang="en-US" smtClean="0"/>
-              <a:t>2/18/2022</a:t>
+              <a:t>10/11/2022</a:t>
             </a:fld>
             <a:endParaRPr lang="en-US"/>
           </a:p>
@@ -5988,7 +5988,7 @@
           <a:p>
             <a:fld id="{38C9C2D7-406E-45EE-9F57-B83131B49240}" type="datetimeFigureOut">
               <a:rPr lang="en-US" smtClean="0"/>
-              <a:t>2/18/2022</a:t>
+              <a:t>10/11/2022</a:t>
             </a:fld>
             <a:endParaRPr lang="en-US"/>
           </a:p>
@@ -6106,7 +6106,7 @@
           <a:p>
             <a:fld id="{38C9C2D7-406E-45EE-9F57-B83131B49240}" type="datetimeFigureOut">
               <a:rPr lang="en-US" smtClean="0"/>
-              <a:t>2/18/2022</a:t>
+              <a:t>10/11/2022</a:t>
             </a:fld>
             <a:endParaRPr lang="en-US"/>
           </a:p>
@@ -6201,7 +6201,7 @@
           <a:p>
             <a:fld id="{38C9C2D7-406E-45EE-9F57-B83131B49240}" type="datetimeFigureOut">
               <a:rPr lang="en-US" smtClean="0"/>
-              <a:t>2/18/2022</a:t>
+              <a:t>10/11/2022</a:t>
             </a:fld>
             <a:endParaRPr lang="en-US"/>
           </a:p>
@@ -6478,7 +6478,7 @@
           <a:p>
             <a:fld id="{38C9C2D7-406E-45EE-9F57-B83131B49240}" type="datetimeFigureOut">
               <a:rPr lang="en-US" smtClean="0"/>
-              <a:t>2/18/2022</a:t>
+              <a:t>10/11/2022</a:t>
             </a:fld>
             <a:endParaRPr lang="en-US"/>
           </a:p>
@@ -6648,7 +6648,7 @@
           <a:p>
             <a:fld id="{7325EFF0-82F5-4880-81B9-BC73A963ECC3}" type="datetime1">
               <a:rPr lang="en-US" smtClean="0"/>
-              <a:t>2/18/2022</a:t>
+              <a:t>10/11/2022</a:t>
             </a:fld>
             <a:endParaRPr lang="en-US"/>
           </a:p>
@@ -6905,7 +6905,7 @@
           <a:p>
             <a:fld id="{38C9C2D7-406E-45EE-9F57-B83131B49240}" type="datetimeFigureOut">
               <a:rPr lang="en-US" smtClean="0"/>
-              <a:t>2/18/2022</a:t>
+              <a:t>10/11/2022</a:t>
             </a:fld>
             <a:endParaRPr lang="en-US"/>
           </a:p>
@@ -7075,7 +7075,7 @@
           <a:p>
             <a:fld id="{38C9C2D7-406E-45EE-9F57-B83131B49240}" type="datetimeFigureOut">
               <a:rPr lang="en-US" smtClean="0"/>
-              <a:t>2/18/2022</a:t>
+              <a:t>10/11/2022</a:t>
             </a:fld>
             <a:endParaRPr lang="en-US"/>
           </a:p>
@@ -7255,7 +7255,7 @@
           <a:p>
             <a:fld id="{38C9C2D7-406E-45EE-9F57-B83131B49240}" type="datetimeFigureOut">
               <a:rPr lang="en-US" smtClean="0"/>
-              <a:t>2/18/2022</a:t>
+              <a:t>10/11/2022</a:t>
             </a:fld>
             <a:endParaRPr lang="en-US"/>
           </a:p>
@@ -7501,7 +7501,7 @@
           <a:p>
             <a:fld id="{5A946811-681C-4AC5-84B7-A52FB525DDA0}" type="datetime1">
               <a:rPr lang="en-US" smtClean="0"/>
-              <a:t>2/18/2022</a:t>
+              <a:t>10/11/2022</a:t>
             </a:fld>
             <a:endParaRPr lang="en-US"/>
           </a:p>
@@ -7733,7 +7733,7 @@
           <a:p>
             <a:fld id="{B26718EC-8AAB-4CFD-80CE-1D0FB821064C}" type="datetime1">
               <a:rPr lang="en-US" smtClean="0"/>
-              <a:t>2/18/2022</a:t>
+              <a:t>10/11/2022</a:t>
             </a:fld>
             <a:endParaRPr lang="en-US"/>
           </a:p>
@@ -8100,7 +8100,7 @@
           <a:p>
             <a:fld id="{B9FC400D-05DF-4711-8592-640F86665B5F}" type="datetime1">
               <a:rPr lang="en-US" smtClean="0"/>
-              <a:t>2/18/2022</a:t>
+              <a:t>10/11/2022</a:t>
             </a:fld>
             <a:endParaRPr lang="en-US"/>
           </a:p>
@@ -8218,7 +8218,7 @@
           <a:p>
             <a:fld id="{21DCA921-A295-445C-9DF4-D32E11171EBC}" type="datetime1">
               <a:rPr lang="en-US" smtClean="0"/>
-              <a:t>2/18/2022</a:t>
+              <a:t>10/11/2022</a:t>
             </a:fld>
             <a:endParaRPr lang="en-US"/>
           </a:p>
@@ -8313,7 +8313,7 @@
           <a:p>
             <a:fld id="{410F1947-2C73-49DA-BF00-06FEB90FBFE0}" type="datetime1">
               <a:rPr lang="en-US" smtClean="0"/>
-              <a:t>2/18/2022</a:t>
+              <a:t>10/11/2022</a:t>
             </a:fld>
             <a:endParaRPr lang="en-US"/>
           </a:p>
@@ -8590,7 +8590,7 @@
           <a:p>
             <a:fld id="{7909FA88-D630-40A8-A7C1-451FFA95718D}" type="datetime1">
               <a:rPr lang="en-US" smtClean="0"/>
-              <a:t>2/18/2022</a:t>
+              <a:t>10/11/2022</a:t>
             </a:fld>
             <a:endParaRPr lang="en-US"/>
           </a:p>
@@ -8847,7 +8847,7 @@
           <a:p>
             <a:fld id="{0B22107A-0A76-4A69-98CE-85E509F6FEC6}" type="datetime1">
               <a:rPr lang="en-US" smtClean="0"/>
-              <a:t>2/18/2022</a:t>
+              <a:t>10/11/2022</a:t>
             </a:fld>
             <a:endParaRPr lang="en-US"/>
           </a:p>
@@ -9060,7 +9060,7 @@
           <a:p>
             <a:fld id="{BFC3CE7D-A49F-42F1-B54B-0205BF41E480}" type="datetime1">
               <a:rPr lang="en-US" smtClean="0"/>
-              <a:t>2/18/2022</a:t>
+              <a:t>10/11/2022</a:t>
             </a:fld>
             <a:endParaRPr lang="en-US"/>
           </a:p>
@@ -9601,7 +9601,7 @@
           <a:p>
             <a:fld id="{38C9C2D7-406E-45EE-9F57-B83131B49240}" type="datetimeFigureOut">
               <a:rPr lang="en-US" smtClean="0"/>
-              <a:t>2/18/2022</a:t>
+              <a:t>10/11/2022</a:t>
             </a:fld>
             <a:endParaRPr lang="en-US"/>
           </a:p>
@@ -13620,7 +13620,7 @@
             </a:ln>
             <a:extLst>
               <a:ext uri="{909E8E84-426E-40dd-AFC4-6F175D3DCCD1}">
-                <a14:hiddenFill xmlns="" xmlns:a14="http://schemas.microsoft.com/office/drawing/2010/main">
+                <a14:hiddenFill xmlns:a14="http://schemas.microsoft.com/office/drawing/2010/main" xmlns="">
                   <a:noFill/>
                 </a14:hiddenFill>
               </a:ext>
@@ -13662,7 +13662,7 @@
             </a:ln>
             <a:extLst>
               <a:ext uri="{909E8E84-426E-40dd-AFC4-6F175D3DCCD1}">
-                <a14:hiddenFill xmlns="" xmlns:a14="http://schemas.microsoft.com/office/drawing/2010/main">
+                <a14:hiddenFill xmlns:a14="http://schemas.microsoft.com/office/drawing/2010/main" xmlns="">
                   <a:noFill/>
                 </a14:hiddenFill>
               </a:ext>
@@ -14026,7 +14026,7 @@
             </a:ln>
             <a:extLst>
               <a:ext uri="{909E8E84-426E-40dd-AFC4-6F175D3DCCD1}">
-                <a14:hiddenFill xmlns="" xmlns:a14="http://schemas.microsoft.com/office/drawing/2010/main">
+                <a14:hiddenFill xmlns:a14="http://schemas.microsoft.com/office/drawing/2010/main" xmlns="">
                   <a:noFill/>
                 </a14:hiddenFill>
               </a:ext>
@@ -14071,7 +14071,7 @@
             </a:ln>
             <a:extLst>
               <a:ext uri="{909E8E84-426E-40dd-AFC4-6F175D3DCCD1}">
-                <a14:hiddenFill xmlns="" xmlns:a14="http://schemas.microsoft.com/office/drawing/2010/main">
+                <a14:hiddenFill xmlns:a14="http://schemas.microsoft.com/office/drawing/2010/main" xmlns="">
                   <a:noFill/>
                 </a14:hiddenFill>
               </a:ext>
@@ -14116,7 +14116,7 @@
             </a:ln>
             <a:extLst>
               <a:ext uri="{909E8E84-426E-40dd-AFC4-6F175D3DCCD1}">
-                <a14:hiddenFill xmlns="" xmlns:a14="http://schemas.microsoft.com/office/drawing/2010/main">
+                <a14:hiddenFill xmlns:a14="http://schemas.microsoft.com/office/drawing/2010/main" xmlns="">
                   <a:noFill/>
                 </a14:hiddenFill>
               </a:ext>
@@ -14160,7 +14160,7 @@
             </a:ln>
             <a:extLst>
               <a:ext uri="{909E8E84-426E-40dd-AFC4-6F175D3DCCD1}">
-                <a14:hiddenFill xmlns="" xmlns:a14="http://schemas.microsoft.com/office/drawing/2010/main">
+                <a14:hiddenFill xmlns:a14="http://schemas.microsoft.com/office/drawing/2010/main" xmlns="">
                   <a:noFill/>
                 </a14:hiddenFill>
               </a:ext>
@@ -16484,8 +16484,8 @@
         </p:nvSpPr>
         <p:spPr>
           <a:xfrm>
-            <a:off x="1008185" y="1472895"/>
-            <a:ext cx="9904324" cy="4755667"/>
+            <a:off x="1008184" y="1472895"/>
+            <a:ext cx="10828773" cy="4755667"/>
           </a:xfrm>
           <a:prstGeom prst="rect">
             <a:avLst/>
@@ -16547,7 +16547,7 @@
                 <a:ea typeface="+mn-ea"/>
                 <a:cs typeface="+mn-cs"/>
               </a:rPr>
-              <a:t>Exam 1 is on </a:t>
+              <a:t>Exam 1 is </a:t>
             </a:r>
             <a:r>
               <a:rPr kumimoji="0" lang="en-US" sz="2400" b="0" i="0" u="none" strike="noStrike" kern="1200" cap="none" spc="0" normalizeH="0" baseline="0" noProof="0" dirty="0">
@@ -16564,29 +16564,10 @@
                 <a:ea typeface="+mn-ea"/>
                 <a:cs typeface="+mn-cs"/>
               </a:rPr>
-              <a:t>Feb 21 (3-10 pm, Start by 8 pm)</a:t>
-            </a:r>
-          </a:p>
-          <a:p>
-            <a:pPr marL="1005840" marR="0" lvl="2" indent="-365760" algn="l" defTabSz="914400" rtl="0" eaLnBrk="1" fontAlgn="auto" latinLnBrk="0" hangingPunct="1">
-              <a:lnSpc>
-                <a:spcPct val="150000"/>
-              </a:lnSpc>
-              <a:spcBef>
-                <a:spcPts val="0"/>
-              </a:spcBef>
-              <a:spcAft>
-                <a:spcPts val="0"/>
-              </a:spcAft>
-              <a:buClrTx/>
-              <a:buSzTx/>
-              <a:buFont typeface="Courier New" panose="02070309020205020404" pitchFamily="49" charset="0"/>
-              <a:buChar char="o"/>
-              <a:tabLst/>
-              <a:defRPr/>
-            </a:pPr>
-            <a:r>
-              <a:rPr kumimoji="0" lang="en-US" sz="1800" b="0" i="0" u="none" strike="noStrike" kern="1200" cap="none" spc="0" normalizeH="0" baseline="0" noProof="0" dirty="0">
+              <a:t>Oct 13, 1:55 pm - 3:45 pm</a:t>
+            </a:r>
+            <a:r>
+              <a:rPr kumimoji="0" lang="en-US" sz="2400" b="0" i="0" u="none" strike="noStrike" kern="1200" cap="none" spc="0" normalizeH="0" baseline="0" noProof="0" dirty="0">
                 <a:ln>
                   <a:noFill/>
                 </a:ln>
@@ -16600,136 +16581,176 @@
                 <a:ea typeface="+mn-ea"/>
                 <a:cs typeface="+mn-cs"/>
               </a:rPr>
-              <a:t>4 blank sheet</a:t>
-            </a:r>
-            <a:r>
-              <a:rPr lang="en-US" dirty="0">
-                <a:solidFill>
-                  <a:srgbClr val="0081E2"/>
-                </a:solidFill>
-                <a:latin typeface="Gotham Bold" pitchFamily="50" charset="0"/>
-              </a:rPr>
-              <a:t>s of paper are allowed</a:t>
-            </a:r>
-            <a:endParaRPr kumimoji="0" lang="en-US" sz="1800" b="0" i="0" u="none" strike="noStrike" kern="1200" cap="none" spc="0" normalizeH="0" baseline="0" noProof="0" dirty="0">
-              <a:ln>
-                <a:noFill/>
-              </a:ln>
-              <a:solidFill>
-                <a:srgbClr val="0081E2"/>
-              </a:solidFill>
-              <a:effectLst/>
-              <a:uLnTx/>
-              <a:uFillTx/>
-              <a:latin typeface="Gotham Bold" pitchFamily="50" charset="0"/>
-              <a:ea typeface="+mn-ea"/>
-              <a:cs typeface="+mn-cs"/>
-            </a:endParaRPr>
-          </a:p>
-          <a:p>
-            <a:pPr marL="1005840" lvl="2" indent="-365760">
-              <a:lnSpc>
-                <a:spcPct val="150000"/>
-              </a:lnSpc>
-              <a:buFont typeface="Courier New" panose="02070309020205020404" pitchFamily="49" charset="0"/>
-              <a:buChar char="o"/>
-              <a:defRPr/>
-            </a:pPr>
-            <a:r>
-              <a:rPr lang="en-US" dirty="0" err="1">
-                <a:solidFill>
-                  <a:srgbClr val="0081E2"/>
-                </a:solidFill>
-                <a:latin typeface="Gotham Bold" pitchFamily="50" charset="0"/>
-              </a:rPr>
-              <a:t>Honorlock</a:t>
-            </a:r>
-            <a:endParaRPr lang="en-US" dirty="0">
-              <a:solidFill>
-                <a:srgbClr val="0081E2"/>
-              </a:solidFill>
-              <a:latin typeface="Gotham Bold" pitchFamily="50" charset="0"/>
-            </a:endParaRPr>
-          </a:p>
-          <a:p>
-            <a:pPr marL="1005840" lvl="2" indent="-365760">
-              <a:lnSpc>
-                <a:spcPct val="150000"/>
-              </a:lnSpc>
-              <a:buFont typeface="Courier New" panose="02070309020205020404" pitchFamily="49" charset="0"/>
-              <a:buChar char="o"/>
-              <a:defRPr/>
-            </a:pPr>
-            <a:r>
-              <a:rPr lang="en-US" dirty="0">
-                <a:solidFill>
-                  <a:srgbClr val="0081E2"/>
-                </a:solidFill>
-                <a:latin typeface="Gotham Bold" pitchFamily="50" charset="0"/>
-              </a:rPr>
-              <a:t>Topics: Module 1-4 (includes Balanced Trees)</a:t>
-            </a:r>
-          </a:p>
-          <a:p>
-            <a:pPr marL="1005840" lvl="2" indent="-365760">
-              <a:lnSpc>
-                <a:spcPct val="150000"/>
-              </a:lnSpc>
-              <a:buFont typeface="Courier New" panose="02070309020205020404" pitchFamily="49" charset="0"/>
-              <a:buChar char="o"/>
-              <a:defRPr/>
-            </a:pPr>
-            <a:r>
-              <a:rPr lang="en-US" dirty="0">
-                <a:solidFill>
-                  <a:srgbClr val="0081E2"/>
-                </a:solidFill>
-                <a:latin typeface="Gotham Bold" pitchFamily="50" charset="0"/>
-              </a:rPr>
-              <a:t>You can use both Iteration or Recursion to solve problems</a:t>
-            </a:r>
-          </a:p>
-          <a:p>
-            <a:pPr marL="1005840" lvl="2" indent="-365760">
-              <a:lnSpc>
-                <a:spcPct val="150000"/>
-              </a:lnSpc>
-              <a:buFont typeface="Courier New" panose="02070309020205020404" pitchFamily="49" charset="0"/>
-              <a:buChar char="o"/>
-              <a:defRPr/>
-            </a:pPr>
-            <a:endParaRPr lang="en-US" dirty="0">
-              <a:solidFill>
-                <a:srgbClr val="0081E2"/>
-              </a:solidFill>
-              <a:latin typeface="Gotham Bold" pitchFamily="50" charset="0"/>
-            </a:endParaRPr>
-          </a:p>
-          <a:p>
-            <a:pPr marL="342900" indent="-342900">
+              <a:t> in CAR 0100</a:t>
+            </a:r>
+          </a:p>
+          <a:p>
+            <a:pPr marL="742950" lvl="1" indent="-285750">
               <a:lnSpc>
                 <a:spcPct val="150000"/>
               </a:lnSpc>
               <a:buFont typeface="Wingdings" panose="05000000000000000000" pitchFamily="2" charset="2"/>
               <a:buChar char="§"/>
+              <a:defRPr/>
             </a:pPr>
             <a:r>
-              <a:rPr lang="en-US" sz="2000" dirty="0">
+              <a:rPr kumimoji="0" lang="en-US" b="0" i="0" u="none" strike="noStrike" kern="1200" cap="none" spc="0" normalizeH="0" baseline="0" noProof="0" dirty="0">
+                <a:ln>
+                  <a:noFill/>
+                </a:ln>
                 <a:solidFill>
                   <a:srgbClr val="0081E2"/>
                 </a:solidFill>
+                <a:effectLst/>
+                <a:uLnTx/>
+                <a:uFillTx/>
                 <a:latin typeface="Gotham Bold" pitchFamily="50" charset="0"/>
-              </a:rPr>
-              <a:t>Read the Topics and Expectations Guide on Canvas</a:t>
-            </a:r>
-          </a:p>
-          <a:p>
-            <a:pPr marL="800100" lvl="1" indent="-342900">
+                <a:ea typeface="+mn-ea"/>
+                <a:cs typeface="+mn-cs"/>
+              </a:rPr>
+              <a:t>Bring 4 blank sheets of paper, a pen, and a computing device with lockdown browser.</a:t>
+            </a:r>
+          </a:p>
+          <a:p>
+            <a:pPr marL="742950" lvl="1" indent="-285750">
               <a:lnSpc>
                 <a:spcPct val="150000"/>
               </a:lnSpc>
               <a:buFont typeface="Wingdings" panose="05000000000000000000" pitchFamily="2" charset="2"/>
               <a:buChar char="§"/>
+              <a:defRPr/>
+            </a:pPr>
+            <a:r>
+              <a:rPr kumimoji="0" lang="en-US" b="0" i="0" u="none" strike="noStrike" kern="1200" cap="none" spc="0" normalizeH="0" baseline="0" noProof="0" dirty="0">
+                <a:ln>
+                  <a:noFill/>
+                </a:ln>
+                <a:solidFill>
+                  <a:srgbClr val="0081E2"/>
+                </a:solidFill>
+                <a:effectLst/>
+                <a:uLnTx/>
+                <a:uFillTx/>
+                <a:latin typeface="Gotham Bold" pitchFamily="50" charset="0"/>
+                <a:ea typeface="+mn-ea"/>
+                <a:cs typeface="+mn-cs"/>
+              </a:rPr>
+              <a:t>Instructions for installing lockdown browser: Lockdown Browser</a:t>
+            </a:r>
+          </a:p>
+          <a:p>
+            <a:pPr marL="742950" lvl="1" indent="-285750">
+              <a:lnSpc>
+                <a:spcPct val="150000"/>
+              </a:lnSpc>
+              <a:buFont typeface="Wingdings" panose="05000000000000000000" pitchFamily="2" charset="2"/>
+              <a:buChar char="§"/>
+              <a:defRPr/>
+            </a:pPr>
+            <a:r>
+              <a:rPr kumimoji="0" lang="en-US" b="0" i="0" u="none" strike="noStrike" kern="1200" cap="none" spc="0" normalizeH="0" baseline="0" noProof="0" dirty="0">
+                <a:ln>
+                  <a:noFill/>
+                </a:ln>
+                <a:solidFill>
+                  <a:srgbClr val="0081E2"/>
+                </a:solidFill>
+                <a:effectLst/>
+                <a:uLnTx/>
+                <a:uFillTx/>
+                <a:latin typeface="Gotham Bold" pitchFamily="50" charset="0"/>
+                <a:ea typeface="+mn-ea"/>
+                <a:cs typeface="+mn-cs"/>
+              </a:rPr>
+              <a:t>Test quiz: Lockdown Browser Test Quiz</a:t>
+            </a:r>
+          </a:p>
+          <a:p>
+            <a:pPr marL="742950" lvl="1" indent="-285750">
+              <a:lnSpc>
+                <a:spcPct val="150000"/>
+              </a:lnSpc>
+              <a:buFont typeface="Wingdings" panose="05000000000000000000" pitchFamily="2" charset="2"/>
+              <a:buChar char="§"/>
+              <a:defRPr/>
+            </a:pPr>
+            <a:r>
+              <a:rPr kumimoji="0" lang="en-US" b="0" i="0" u="none" strike="noStrike" kern="1200" cap="none" spc="0" normalizeH="0" baseline="0" noProof="0" dirty="0">
+                <a:ln>
+                  <a:noFill/>
+                </a:ln>
+                <a:solidFill>
+                  <a:srgbClr val="0081E2"/>
+                </a:solidFill>
+                <a:effectLst/>
+                <a:uLnTx/>
+                <a:uFillTx/>
+                <a:latin typeface="Gotham Bold" pitchFamily="50" charset="0"/>
+                <a:ea typeface="+mn-ea"/>
+                <a:cs typeface="+mn-cs"/>
+              </a:rPr>
+              <a:t>Those who need accommodations must take the exam at the DRC test center.</a:t>
+            </a:r>
+          </a:p>
+          <a:p>
+            <a:pPr marL="742950" lvl="1" indent="-285750">
+              <a:lnSpc>
+                <a:spcPct val="150000"/>
+              </a:lnSpc>
+              <a:buFont typeface="Wingdings" panose="05000000000000000000" pitchFamily="2" charset="2"/>
+              <a:buChar char="§"/>
+              <a:defRPr/>
+            </a:pPr>
+            <a:r>
+              <a:rPr kumimoji="0" lang="en-US" b="0" i="0" u="none" strike="noStrike" kern="1200" cap="none" spc="0" normalizeH="0" baseline="0" noProof="0" dirty="0">
+                <a:ln>
+                  <a:noFill/>
+                </a:ln>
+                <a:solidFill>
+                  <a:srgbClr val="0081E2"/>
+                </a:solidFill>
+                <a:effectLst/>
+                <a:uLnTx/>
+                <a:uFillTx/>
+                <a:latin typeface="Gotham Bold" pitchFamily="50" charset="0"/>
+                <a:ea typeface="+mn-ea"/>
+                <a:cs typeface="+mn-cs"/>
+              </a:rPr>
+              <a:t>The exam will cover module 1-5 (up to deletion in heaps) and one double-sided letter-sized sheet of handwritten notes is allowed on the exam.</a:t>
+            </a:r>
+          </a:p>
+          <a:p>
+            <a:pPr marL="742950" lvl="1" indent="-285750">
+              <a:lnSpc>
+                <a:spcPct val="150000"/>
+              </a:lnSpc>
+              <a:buFont typeface="Wingdings" panose="05000000000000000000" pitchFamily="2" charset="2"/>
+              <a:buChar char="§"/>
+              <a:defRPr/>
+            </a:pPr>
+            <a:r>
+              <a:rPr kumimoji="0" lang="en-US" b="0" i="0" u="none" strike="noStrike" kern="1200" cap="none" spc="0" normalizeH="0" baseline="0" noProof="0" dirty="0">
+                <a:ln>
+                  <a:noFill/>
+                </a:ln>
+                <a:solidFill>
+                  <a:srgbClr val="0081E2"/>
+                </a:solidFill>
+                <a:effectLst/>
+                <a:uLnTx/>
+                <a:uFillTx/>
+                <a:latin typeface="Gotham Bold" pitchFamily="50" charset="0"/>
+                <a:ea typeface="+mn-ea"/>
+                <a:cs typeface="+mn-cs"/>
+              </a:rPr>
+              <a:t>The topics and expectations guide is up.</a:t>
+            </a:r>
+          </a:p>
+          <a:p>
+            <a:pPr lvl="1">
+              <a:lnSpc>
+                <a:spcPct val="150000"/>
+              </a:lnSpc>
             </a:pPr>
             <a:endParaRPr lang="en-US" sz="100" dirty="0">
               <a:solidFill>
@@ -16909,7 +16930,7 @@
                 </a:solidFill>
                 <a:latin typeface="Consolas" panose="020B0609020204030204" pitchFamily="49" charset="0"/>
               </a:rPr>
-              <a:t>Know or infer the runtime in terms of Big O of algorithms and scenarios covered in Weeks 2-5 for best, average, and worst case</a:t>
+              <a:t>Know or infer the runtime in terms of Big O of algorithms and scenarios covered in Weeks 2-6 for best, average, and worst case</a:t>
             </a:r>
           </a:p>
           <a:p>
@@ -16939,7 +16960,7 @@
                 </a:solidFill>
                 <a:latin typeface="Consolas" panose="020B0609020204030204" pitchFamily="49" charset="0"/>
               </a:rPr>
-              <a:t>Know the three methods of evaluating the time execution of an algorithm </a:t>
+              <a:t>Know the three methods of evaluating the time execution of an algorithm</a:t>
             </a:r>
           </a:p>
           <a:p>
@@ -17035,7 +17056,7 @@
                 </a:solidFill>
                 <a:latin typeface="Consolas" panose="020B0609020204030204" pitchFamily="49" charset="0"/>
               </a:rPr>
-              <a:t>Critically thinking when a certain type is better in terms of performance</a:t>
+              <a:t>Critically think when a certain type is better in terms of performance</a:t>
             </a:r>
           </a:p>
           <a:p>
@@ -17050,7 +17071,7 @@
                 </a:solidFill>
                 <a:latin typeface="Consolas" panose="020B0609020204030204" pitchFamily="49" charset="0"/>
               </a:rPr>
-              <a:t>Pseudocodes for common operations or for solving a problem </a:t>
+              <a:t>Pseudocodes for common operations or for solving a problem</a:t>
             </a:r>
           </a:p>
           <a:p>
@@ -17065,7 +17086,7 @@
                 </a:solidFill>
                 <a:latin typeface="Consolas" panose="020B0609020204030204" pitchFamily="49" charset="0"/>
               </a:rPr>
-              <a:t>Use cases of Stacks to evaluate expressions, call stacks, balancing parentheses, and finding palindromes.</a:t>
+              <a:t>Use cases of Stacks to evaluate expressions, call stacks, balancing parentheses, and finding palindromes</a:t>
             </a:r>
           </a:p>
           <a:p>
@@ -17080,7 +17101,7 @@
                 </a:solidFill>
                 <a:latin typeface="Consolas" panose="020B0609020204030204" pitchFamily="49" charset="0"/>
               </a:rPr>
-              <a:t>Performance </a:t>
+              <a:t>Performance (in terms of time and space)</a:t>
             </a:r>
           </a:p>
           <a:p>

</xml_diff>

<commit_message>
exam 1 review updated
</commit_message>
<xml_diff>
--- a/Slides/Slides-PPT/Exam 1 - Review A.pptx
+++ b/Slides/Slides-PPT/Exam 1 - Review A.pptx
@@ -223,7 +223,7 @@
           <a:p>
             <a:fld id="{43386AF1-EF24-4659-9089-2771856A9EA2}" type="datetimeFigureOut">
               <a:rPr lang="en-US" smtClean="0"/>
-              <a:t>2/27/2023</a:t>
+              <a:t>6/16/2023</a:t>
             </a:fld>
             <a:endParaRPr lang="en-US"/>
           </a:p>
@@ -4431,7 +4431,7 @@
           <a:p>
             <a:fld id="{F8616885-9ED8-4298-9149-C5A410E7F61A}" type="datetime1">
               <a:rPr lang="en-US" smtClean="0"/>
-              <a:t>2/27/2023</a:t>
+              <a:t>6/16/2023</a:t>
             </a:fld>
             <a:endParaRPr lang="en-US"/>
           </a:p>
@@ -4601,7 +4601,7 @@
           <a:p>
             <a:fld id="{46647952-6535-4065-B4F6-C94B3D00772F}" type="datetime1">
               <a:rPr lang="en-US" smtClean="0"/>
-              <a:t>2/27/2023</a:t>
+              <a:t>6/16/2023</a:t>
             </a:fld>
             <a:endParaRPr lang="en-US"/>
           </a:p>
@@ -4781,7 +4781,7 @@
           <a:p>
             <a:fld id="{63870D39-F97D-4ECC-909C-35255E9A37F7}" type="datetime1">
               <a:rPr lang="en-US" smtClean="0"/>
-              <a:t>2/27/2023</a:t>
+              <a:t>6/16/2023</a:t>
             </a:fld>
             <a:endParaRPr lang="en-US"/>
           </a:p>
@@ -4973,7 +4973,7 @@
           <a:p>
             <a:fld id="{38C9C2D7-406E-45EE-9F57-B83131B49240}" type="datetimeFigureOut">
               <a:rPr lang="en-US" smtClean="0"/>
-              <a:t>2/27/2023</a:t>
+              <a:t>6/16/2023</a:t>
             </a:fld>
             <a:endParaRPr lang="en-US"/>
           </a:p>
@@ -5143,7 +5143,7 @@
           <a:p>
             <a:fld id="{38C9C2D7-406E-45EE-9F57-B83131B49240}" type="datetimeFigureOut">
               <a:rPr lang="en-US" smtClean="0"/>
-              <a:t>2/27/2023</a:t>
+              <a:t>6/16/2023</a:t>
             </a:fld>
             <a:endParaRPr lang="en-US"/>
           </a:p>
@@ -5389,7 +5389,7 @@
           <a:p>
             <a:fld id="{38C9C2D7-406E-45EE-9F57-B83131B49240}" type="datetimeFigureOut">
               <a:rPr lang="en-US" smtClean="0"/>
-              <a:t>2/27/2023</a:t>
+              <a:t>6/16/2023</a:t>
             </a:fld>
             <a:endParaRPr lang="en-US"/>
           </a:p>
@@ -5621,7 +5621,7 @@
           <a:p>
             <a:fld id="{38C9C2D7-406E-45EE-9F57-B83131B49240}" type="datetimeFigureOut">
               <a:rPr lang="en-US" smtClean="0"/>
-              <a:t>2/27/2023</a:t>
+              <a:t>6/16/2023</a:t>
             </a:fld>
             <a:endParaRPr lang="en-US"/>
           </a:p>
@@ -5988,7 +5988,7 @@
           <a:p>
             <a:fld id="{38C9C2D7-406E-45EE-9F57-B83131B49240}" type="datetimeFigureOut">
               <a:rPr lang="en-US" smtClean="0"/>
-              <a:t>2/27/2023</a:t>
+              <a:t>6/16/2023</a:t>
             </a:fld>
             <a:endParaRPr lang="en-US"/>
           </a:p>
@@ -6106,7 +6106,7 @@
           <a:p>
             <a:fld id="{38C9C2D7-406E-45EE-9F57-B83131B49240}" type="datetimeFigureOut">
               <a:rPr lang="en-US" smtClean="0"/>
-              <a:t>2/27/2023</a:t>
+              <a:t>6/16/2023</a:t>
             </a:fld>
             <a:endParaRPr lang="en-US"/>
           </a:p>
@@ -6201,7 +6201,7 @@
           <a:p>
             <a:fld id="{38C9C2D7-406E-45EE-9F57-B83131B49240}" type="datetimeFigureOut">
               <a:rPr lang="en-US" smtClean="0"/>
-              <a:t>2/27/2023</a:t>
+              <a:t>6/16/2023</a:t>
             </a:fld>
             <a:endParaRPr lang="en-US"/>
           </a:p>
@@ -6478,7 +6478,7 @@
           <a:p>
             <a:fld id="{38C9C2D7-406E-45EE-9F57-B83131B49240}" type="datetimeFigureOut">
               <a:rPr lang="en-US" smtClean="0"/>
-              <a:t>2/27/2023</a:t>
+              <a:t>6/16/2023</a:t>
             </a:fld>
             <a:endParaRPr lang="en-US"/>
           </a:p>
@@ -6648,7 +6648,7 @@
           <a:p>
             <a:fld id="{7325EFF0-82F5-4880-81B9-BC73A963ECC3}" type="datetime1">
               <a:rPr lang="en-US" smtClean="0"/>
-              <a:t>2/27/2023</a:t>
+              <a:t>6/16/2023</a:t>
             </a:fld>
             <a:endParaRPr lang="en-US"/>
           </a:p>
@@ -6905,7 +6905,7 @@
           <a:p>
             <a:fld id="{38C9C2D7-406E-45EE-9F57-B83131B49240}" type="datetimeFigureOut">
               <a:rPr lang="en-US" smtClean="0"/>
-              <a:t>2/27/2023</a:t>
+              <a:t>6/16/2023</a:t>
             </a:fld>
             <a:endParaRPr lang="en-US"/>
           </a:p>
@@ -7075,7 +7075,7 @@
           <a:p>
             <a:fld id="{38C9C2D7-406E-45EE-9F57-B83131B49240}" type="datetimeFigureOut">
               <a:rPr lang="en-US" smtClean="0"/>
-              <a:t>2/27/2023</a:t>
+              <a:t>6/16/2023</a:t>
             </a:fld>
             <a:endParaRPr lang="en-US"/>
           </a:p>
@@ -7255,7 +7255,7 @@
           <a:p>
             <a:fld id="{38C9C2D7-406E-45EE-9F57-B83131B49240}" type="datetimeFigureOut">
               <a:rPr lang="en-US" smtClean="0"/>
-              <a:t>2/27/2023</a:t>
+              <a:t>6/16/2023</a:t>
             </a:fld>
             <a:endParaRPr lang="en-US"/>
           </a:p>
@@ -7501,7 +7501,7 @@
           <a:p>
             <a:fld id="{5A946811-681C-4AC5-84B7-A52FB525DDA0}" type="datetime1">
               <a:rPr lang="en-US" smtClean="0"/>
-              <a:t>2/27/2023</a:t>
+              <a:t>6/16/2023</a:t>
             </a:fld>
             <a:endParaRPr lang="en-US"/>
           </a:p>
@@ -7733,7 +7733,7 @@
           <a:p>
             <a:fld id="{B26718EC-8AAB-4CFD-80CE-1D0FB821064C}" type="datetime1">
               <a:rPr lang="en-US" smtClean="0"/>
-              <a:t>2/27/2023</a:t>
+              <a:t>6/16/2023</a:t>
             </a:fld>
             <a:endParaRPr lang="en-US"/>
           </a:p>
@@ -8100,7 +8100,7 @@
           <a:p>
             <a:fld id="{B9FC400D-05DF-4711-8592-640F86665B5F}" type="datetime1">
               <a:rPr lang="en-US" smtClean="0"/>
-              <a:t>2/27/2023</a:t>
+              <a:t>6/16/2023</a:t>
             </a:fld>
             <a:endParaRPr lang="en-US"/>
           </a:p>
@@ -8218,7 +8218,7 @@
           <a:p>
             <a:fld id="{21DCA921-A295-445C-9DF4-D32E11171EBC}" type="datetime1">
               <a:rPr lang="en-US" smtClean="0"/>
-              <a:t>2/27/2023</a:t>
+              <a:t>6/16/2023</a:t>
             </a:fld>
             <a:endParaRPr lang="en-US"/>
           </a:p>
@@ -8313,7 +8313,7 @@
           <a:p>
             <a:fld id="{410F1947-2C73-49DA-BF00-06FEB90FBFE0}" type="datetime1">
               <a:rPr lang="en-US" smtClean="0"/>
-              <a:t>2/27/2023</a:t>
+              <a:t>6/16/2023</a:t>
             </a:fld>
             <a:endParaRPr lang="en-US"/>
           </a:p>
@@ -8590,7 +8590,7 @@
           <a:p>
             <a:fld id="{7909FA88-D630-40A8-A7C1-451FFA95718D}" type="datetime1">
               <a:rPr lang="en-US" smtClean="0"/>
-              <a:t>2/27/2023</a:t>
+              <a:t>6/16/2023</a:t>
             </a:fld>
             <a:endParaRPr lang="en-US"/>
           </a:p>
@@ -8847,7 +8847,7 @@
           <a:p>
             <a:fld id="{0B22107A-0A76-4A69-98CE-85E509F6FEC6}" type="datetime1">
               <a:rPr lang="en-US" smtClean="0"/>
-              <a:t>2/27/2023</a:t>
+              <a:t>6/16/2023</a:t>
             </a:fld>
             <a:endParaRPr lang="en-US"/>
           </a:p>
@@ -9060,7 +9060,7 @@
           <a:p>
             <a:fld id="{BFC3CE7D-A49F-42F1-B54B-0205BF41E480}" type="datetime1">
               <a:rPr lang="en-US" smtClean="0"/>
-              <a:t>2/27/2023</a:t>
+              <a:t>6/16/2023</a:t>
             </a:fld>
             <a:endParaRPr lang="en-US"/>
           </a:p>
@@ -9601,7 +9601,7 @@
           <a:p>
             <a:fld id="{38C9C2D7-406E-45EE-9F57-B83131B49240}" type="datetimeFigureOut">
               <a:rPr lang="en-US" smtClean="0"/>
-              <a:t>2/27/2023</a:t>
+              <a:t>6/16/2023</a:t>
             </a:fld>
             <a:endParaRPr lang="en-US"/>
           </a:p>
@@ -13620,7 +13620,7 @@
             </a:ln>
             <a:extLst>
               <a:ext uri="{909E8E84-426E-40dd-AFC4-6F175D3DCCD1}">
-                <a14:hiddenFill xmlns="" xmlns:a14="http://schemas.microsoft.com/office/drawing/2010/main">
+                <a14:hiddenFill xmlns:a14="http://schemas.microsoft.com/office/drawing/2010/main" xmlns="">
                   <a:noFill/>
                 </a14:hiddenFill>
               </a:ext>
@@ -13662,7 +13662,7 @@
             </a:ln>
             <a:extLst>
               <a:ext uri="{909E8E84-426E-40dd-AFC4-6F175D3DCCD1}">
-                <a14:hiddenFill xmlns="" xmlns:a14="http://schemas.microsoft.com/office/drawing/2010/main">
+                <a14:hiddenFill xmlns:a14="http://schemas.microsoft.com/office/drawing/2010/main" xmlns="">
                   <a:noFill/>
                 </a14:hiddenFill>
               </a:ext>
@@ -14026,7 +14026,7 @@
             </a:ln>
             <a:extLst>
               <a:ext uri="{909E8E84-426E-40dd-AFC4-6F175D3DCCD1}">
-                <a14:hiddenFill xmlns="" xmlns:a14="http://schemas.microsoft.com/office/drawing/2010/main">
+                <a14:hiddenFill xmlns:a14="http://schemas.microsoft.com/office/drawing/2010/main" xmlns="">
                   <a:noFill/>
                 </a14:hiddenFill>
               </a:ext>
@@ -14071,7 +14071,7 @@
             </a:ln>
             <a:extLst>
               <a:ext uri="{909E8E84-426E-40dd-AFC4-6F175D3DCCD1}">
-                <a14:hiddenFill xmlns="" xmlns:a14="http://schemas.microsoft.com/office/drawing/2010/main">
+                <a14:hiddenFill xmlns:a14="http://schemas.microsoft.com/office/drawing/2010/main" xmlns="">
                   <a:noFill/>
                 </a14:hiddenFill>
               </a:ext>
@@ -14116,7 +14116,7 @@
             </a:ln>
             <a:extLst>
               <a:ext uri="{909E8E84-426E-40dd-AFC4-6F175D3DCCD1}">
-                <a14:hiddenFill xmlns="" xmlns:a14="http://schemas.microsoft.com/office/drawing/2010/main">
+                <a14:hiddenFill xmlns:a14="http://schemas.microsoft.com/office/drawing/2010/main" xmlns="">
                   <a:noFill/>
                 </a14:hiddenFill>
               </a:ext>
@@ -14160,7 +14160,7 @@
             </a:ln>
             <a:extLst>
               <a:ext uri="{909E8E84-426E-40dd-AFC4-6F175D3DCCD1}">
-                <a14:hiddenFill xmlns="" xmlns:a14="http://schemas.microsoft.com/office/drawing/2010/main">
+                <a14:hiddenFill xmlns:a14="http://schemas.microsoft.com/office/drawing/2010/main" xmlns="">
                   <a:noFill/>
                 </a14:hiddenFill>
               </a:ext>
@@ -16564,7 +16564,7 @@
                 <a:ea typeface="+mn-ea"/>
                 <a:cs typeface="+mn-cs"/>
               </a:rPr>
-              <a:t>Mar 1, 2 pm - 10 pm</a:t>
+              <a:t>Jun 21, 2 pm - 10 pm</a:t>
             </a:r>
             <a:endParaRPr kumimoji="0" lang="en-US" sz="2400" b="0" i="0" u="none" strike="noStrike" kern="1200" cap="none" spc="0" normalizeH="0" baseline="0" noProof="0" dirty="0">
               <a:ln>
@@ -16632,7 +16632,7 @@
                 <a:ea typeface="+mn-ea"/>
                 <a:cs typeface="+mn-cs"/>
               </a:rPr>
-              <a:t>If you are a student in campus or hybrid sections (including Section OVER), you must take the exam between 2 pm - 10 pm EST on March 1 (this Wednesday). This means you must </a:t>
+              <a:t>If you are a student in campus or hybrid sections, you must take the exam between 2 pm - 10 pm EST on March 1 (this Wednesday). This means you must </a:t>
             </a:r>
             <a:r>
               <a:rPr kumimoji="0" lang="en-US" b="0" i="0" u="none" strike="noStrike" kern="1200" cap="none" spc="0" normalizeH="0" baseline="0" noProof="0" dirty="0">
@@ -16693,7 +16693,7 @@
                 <a:ea typeface="+mn-ea"/>
                 <a:cs typeface="+mn-cs"/>
               </a:rPr>
-              <a:t>If you are a student in the UF Online program (UFOL/UDER section), you can take the exam between March 1 - 4 anytime.</a:t>
+              <a:t>If you are a student in the UF Online program (UFOL/UDER section), you can take the exam between Jun 21-Jun 25 anytime.</a:t>
             </a:r>
           </a:p>
         </p:txBody>

</xml_diff>

<commit_message>
exam review A updated
</commit_message>
<xml_diff>
--- a/Slides/Slides-PPT/Exam 1 - Review A.pptx
+++ b/Slides/Slides-PPT/Exam 1 - Review A.pptx
@@ -227,7 +227,7 @@
           <a:p>
             <a:fld id="{43386AF1-EF24-4659-9089-2771856A9EA2}" type="datetimeFigureOut">
               <a:rPr lang="en-US" smtClean="0"/>
-              <a:t>10/15/2024</a:t>
+              <a:t>2/24/2025</a:t>
             </a:fld>
             <a:endParaRPr lang="en-US"/>
           </a:p>
@@ -5039,7 +5039,7 @@
           <a:p>
             <a:fld id="{F8616885-9ED8-4298-9149-C5A410E7F61A}" type="datetime1">
               <a:rPr lang="en-US" smtClean="0"/>
-              <a:t>10/15/2024</a:t>
+              <a:t>2/24/2025</a:t>
             </a:fld>
             <a:endParaRPr lang="en-US"/>
           </a:p>
@@ -5209,7 +5209,7 @@
           <a:p>
             <a:fld id="{46647952-6535-4065-B4F6-C94B3D00772F}" type="datetime1">
               <a:rPr lang="en-US" smtClean="0"/>
-              <a:t>10/15/2024</a:t>
+              <a:t>2/24/2025</a:t>
             </a:fld>
             <a:endParaRPr lang="en-US"/>
           </a:p>
@@ -5389,7 +5389,7 @@
           <a:p>
             <a:fld id="{63870D39-F97D-4ECC-909C-35255E9A37F7}" type="datetime1">
               <a:rPr lang="en-US" smtClean="0"/>
-              <a:t>10/15/2024</a:t>
+              <a:t>2/24/2025</a:t>
             </a:fld>
             <a:endParaRPr lang="en-US"/>
           </a:p>
@@ -5581,7 +5581,7 @@
           <a:p>
             <a:fld id="{38C9C2D7-406E-45EE-9F57-B83131B49240}" type="datetimeFigureOut">
               <a:rPr lang="en-US" smtClean="0"/>
-              <a:t>10/15/2024</a:t>
+              <a:t>2/24/2025</a:t>
             </a:fld>
             <a:endParaRPr lang="en-US"/>
           </a:p>
@@ -5751,7 +5751,7 @@
           <a:p>
             <a:fld id="{38C9C2D7-406E-45EE-9F57-B83131B49240}" type="datetimeFigureOut">
               <a:rPr lang="en-US" smtClean="0"/>
-              <a:t>10/15/2024</a:t>
+              <a:t>2/24/2025</a:t>
             </a:fld>
             <a:endParaRPr lang="en-US"/>
           </a:p>
@@ -5997,7 +5997,7 @@
           <a:p>
             <a:fld id="{38C9C2D7-406E-45EE-9F57-B83131B49240}" type="datetimeFigureOut">
               <a:rPr lang="en-US" smtClean="0"/>
-              <a:t>10/15/2024</a:t>
+              <a:t>2/24/2025</a:t>
             </a:fld>
             <a:endParaRPr lang="en-US"/>
           </a:p>
@@ -6229,7 +6229,7 @@
           <a:p>
             <a:fld id="{38C9C2D7-406E-45EE-9F57-B83131B49240}" type="datetimeFigureOut">
               <a:rPr lang="en-US" smtClean="0"/>
-              <a:t>10/15/2024</a:t>
+              <a:t>2/24/2025</a:t>
             </a:fld>
             <a:endParaRPr lang="en-US"/>
           </a:p>
@@ -6596,7 +6596,7 @@
           <a:p>
             <a:fld id="{38C9C2D7-406E-45EE-9F57-B83131B49240}" type="datetimeFigureOut">
               <a:rPr lang="en-US" smtClean="0"/>
-              <a:t>10/15/2024</a:t>
+              <a:t>2/24/2025</a:t>
             </a:fld>
             <a:endParaRPr lang="en-US"/>
           </a:p>
@@ -6714,7 +6714,7 @@
           <a:p>
             <a:fld id="{38C9C2D7-406E-45EE-9F57-B83131B49240}" type="datetimeFigureOut">
               <a:rPr lang="en-US" smtClean="0"/>
-              <a:t>10/15/2024</a:t>
+              <a:t>2/24/2025</a:t>
             </a:fld>
             <a:endParaRPr lang="en-US"/>
           </a:p>
@@ -6809,7 +6809,7 @@
           <a:p>
             <a:fld id="{38C9C2D7-406E-45EE-9F57-B83131B49240}" type="datetimeFigureOut">
               <a:rPr lang="en-US" smtClean="0"/>
-              <a:t>10/15/2024</a:t>
+              <a:t>2/24/2025</a:t>
             </a:fld>
             <a:endParaRPr lang="en-US"/>
           </a:p>
@@ -7086,7 +7086,7 @@
           <a:p>
             <a:fld id="{38C9C2D7-406E-45EE-9F57-B83131B49240}" type="datetimeFigureOut">
               <a:rPr lang="en-US" smtClean="0"/>
-              <a:t>10/15/2024</a:t>
+              <a:t>2/24/2025</a:t>
             </a:fld>
             <a:endParaRPr lang="en-US"/>
           </a:p>
@@ -7256,7 +7256,7 @@
           <a:p>
             <a:fld id="{7325EFF0-82F5-4880-81B9-BC73A963ECC3}" type="datetime1">
               <a:rPr lang="en-US" smtClean="0"/>
-              <a:t>10/15/2024</a:t>
+              <a:t>2/24/2025</a:t>
             </a:fld>
             <a:endParaRPr lang="en-US"/>
           </a:p>
@@ -7513,7 +7513,7 @@
           <a:p>
             <a:fld id="{38C9C2D7-406E-45EE-9F57-B83131B49240}" type="datetimeFigureOut">
               <a:rPr lang="en-US" smtClean="0"/>
-              <a:t>10/15/2024</a:t>
+              <a:t>2/24/2025</a:t>
             </a:fld>
             <a:endParaRPr lang="en-US"/>
           </a:p>
@@ -7683,7 +7683,7 @@
           <a:p>
             <a:fld id="{38C9C2D7-406E-45EE-9F57-B83131B49240}" type="datetimeFigureOut">
               <a:rPr lang="en-US" smtClean="0"/>
-              <a:t>10/15/2024</a:t>
+              <a:t>2/24/2025</a:t>
             </a:fld>
             <a:endParaRPr lang="en-US"/>
           </a:p>
@@ -7863,7 +7863,7 @@
           <a:p>
             <a:fld id="{38C9C2D7-406E-45EE-9F57-B83131B49240}" type="datetimeFigureOut">
               <a:rPr lang="en-US" smtClean="0"/>
-              <a:t>10/15/2024</a:t>
+              <a:t>2/24/2025</a:t>
             </a:fld>
             <a:endParaRPr lang="en-US"/>
           </a:p>
@@ -8109,7 +8109,7 @@
           <a:p>
             <a:fld id="{5A946811-681C-4AC5-84B7-A52FB525DDA0}" type="datetime1">
               <a:rPr lang="en-US" smtClean="0"/>
-              <a:t>10/15/2024</a:t>
+              <a:t>2/24/2025</a:t>
             </a:fld>
             <a:endParaRPr lang="en-US"/>
           </a:p>
@@ -8341,7 +8341,7 @@
           <a:p>
             <a:fld id="{B26718EC-8AAB-4CFD-80CE-1D0FB821064C}" type="datetime1">
               <a:rPr lang="en-US" smtClean="0"/>
-              <a:t>10/15/2024</a:t>
+              <a:t>2/24/2025</a:t>
             </a:fld>
             <a:endParaRPr lang="en-US"/>
           </a:p>
@@ -8708,7 +8708,7 @@
           <a:p>
             <a:fld id="{B9FC400D-05DF-4711-8592-640F86665B5F}" type="datetime1">
               <a:rPr lang="en-US" smtClean="0"/>
-              <a:t>10/15/2024</a:t>
+              <a:t>2/24/2025</a:t>
             </a:fld>
             <a:endParaRPr lang="en-US"/>
           </a:p>
@@ -8826,7 +8826,7 @@
           <a:p>
             <a:fld id="{21DCA921-A295-445C-9DF4-D32E11171EBC}" type="datetime1">
               <a:rPr lang="en-US" smtClean="0"/>
-              <a:t>10/15/2024</a:t>
+              <a:t>2/24/2025</a:t>
             </a:fld>
             <a:endParaRPr lang="en-US"/>
           </a:p>
@@ -8921,7 +8921,7 @@
           <a:p>
             <a:fld id="{410F1947-2C73-49DA-BF00-06FEB90FBFE0}" type="datetime1">
               <a:rPr lang="en-US" smtClean="0"/>
-              <a:t>10/15/2024</a:t>
+              <a:t>2/24/2025</a:t>
             </a:fld>
             <a:endParaRPr lang="en-US"/>
           </a:p>
@@ -9198,7 +9198,7 @@
           <a:p>
             <a:fld id="{7909FA88-D630-40A8-A7C1-451FFA95718D}" type="datetime1">
               <a:rPr lang="en-US" smtClean="0"/>
-              <a:t>10/15/2024</a:t>
+              <a:t>2/24/2025</a:t>
             </a:fld>
             <a:endParaRPr lang="en-US"/>
           </a:p>
@@ -9455,7 +9455,7 @@
           <a:p>
             <a:fld id="{0B22107A-0A76-4A69-98CE-85E509F6FEC6}" type="datetime1">
               <a:rPr lang="en-US" smtClean="0"/>
-              <a:t>10/15/2024</a:t>
+              <a:t>2/24/2025</a:t>
             </a:fld>
             <a:endParaRPr lang="en-US"/>
           </a:p>
@@ -9668,7 +9668,7 @@
           <a:p>
             <a:fld id="{BFC3CE7D-A49F-42F1-B54B-0205BF41E480}" type="datetime1">
               <a:rPr lang="en-US" smtClean="0"/>
-              <a:t>10/15/2024</a:t>
+              <a:t>2/24/2025</a:t>
             </a:fld>
             <a:endParaRPr lang="en-US"/>
           </a:p>
@@ -10209,7 +10209,7 @@
           <a:p>
             <a:fld id="{38C9C2D7-406E-45EE-9F57-B83131B49240}" type="datetimeFigureOut">
               <a:rPr lang="en-US" smtClean="0"/>
-              <a:t>10/15/2024</a:t>
+              <a:t>2/24/2025</a:t>
             </a:fld>
             <a:endParaRPr lang="en-US"/>
           </a:p>
@@ -14228,7 +14228,7 @@
             </a:ln>
             <a:extLst>
               <a:ext uri="{909E8E84-426E-40dd-AFC4-6F175D3DCCD1}">
-                <a14:hiddenFill xmlns="" xmlns:a14="http://schemas.microsoft.com/office/drawing/2010/main">
+                <a14:hiddenFill xmlns:a14="http://schemas.microsoft.com/office/drawing/2010/main" xmlns="">
                   <a:noFill/>
                 </a14:hiddenFill>
               </a:ext>
@@ -14270,7 +14270,7 @@
             </a:ln>
             <a:extLst>
               <a:ext uri="{909E8E84-426E-40dd-AFC4-6F175D3DCCD1}">
-                <a14:hiddenFill xmlns="" xmlns:a14="http://schemas.microsoft.com/office/drawing/2010/main">
+                <a14:hiddenFill xmlns:a14="http://schemas.microsoft.com/office/drawing/2010/main" xmlns="">
                   <a:noFill/>
                 </a14:hiddenFill>
               </a:ext>
@@ -14634,7 +14634,7 @@
             </a:ln>
             <a:extLst>
               <a:ext uri="{909E8E84-426E-40dd-AFC4-6F175D3DCCD1}">
-                <a14:hiddenFill xmlns="" xmlns:a14="http://schemas.microsoft.com/office/drawing/2010/main">
+                <a14:hiddenFill xmlns:a14="http://schemas.microsoft.com/office/drawing/2010/main" xmlns="">
                   <a:noFill/>
                 </a14:hiddenFill>
               </a:ext>
@@ -14679,7 +14679,7 @@
             </a:ln>
             <a:extLst>
               <a:ext uri="{909E8E84-426E-40dd-AFC4-6F175D3DCCD1}">
-                <a14:hiddenFill xmlns="" xmlns:a14="http://schemas.microsoft.com/office/drawing/2010/main">
+                <a14:hiddenFill xmlns:a14="http://schemas.microsoft.com/office/drawing/2010/main" xmlns="">
                   <a:noFill/>
                 </a14:hiddenFill>
               </a:ext>
@@ -14724,7 +14724,7 @@
             </a:ln>
             <a:extLst>
               <a:ext uri="{909E8E84-426E-40dd-AFC4-6F175D3DCCD1}">
-                <a14:hiddenFill xmlns="" xmlns:a14="http://schemas.microsoft.com/office/drawing/2010/main">
+                <a14:hiddenFill xmlns:a14="http://schemas.microsoft.com/office/drawing/2010/main" xmlns="">
                   <a:noFill/>
                 </a14:hiddenFill>
               </a:ext>
@@ -14768,7 +14768,7 @@
             </a:ln>
             <a:extLst>
               <a:ext uri="{909E8E84-426E-40dd-AFC4-6F175D3DCCD1}">
-                <a14:hiddenFill xmlns="" xmlns:a14="http://schemas.microsoft.com/office/drawing/2010/main">
+                <a14:hiddenFill xmlns:a14="http://schemas.microsoft.com/office/drawing/2010/main" xmlns="">
                   <a:noFill/>
                 </a14:hiddenFill>
               </a:ext>
@@ -19869,8 +19869,8 @@
         </p:nvSpPr>
         <p:spPr>
           <a:xfrm>
-            <a:off x="1008184" y="1472895"/>
-            <a:ext cx="10828773" cy="4755667"/>
+            <a:off x="987636" y="1483169"/>
+            <a:ext cx="11916706" cy="4755667"/>
           </a:xfrm>
           <a:prstGeom prst="rect">
             <a:avLst/>
@@ -19900,71 +19900,48 @@
             </a:lvl1pPr>
           </a:lstStyle>
           <a:p>
-            <a:pPr marL="285750" marR="0" lvl="0" indent="-285750" algn="l" defTabSz="914400" rtl="0" eaLnBrk="1" fontAlgn="auto" latinLnBrk="0" hangingPunct="1">
+            <a:pPr marL="285750" indent="-285750">
               <a:lnSpc>
                 <a:spcPct val="150000"/>
               </a:lnSpc>
-              <a:spcBef>
-                <a:spcPts val="0"/>
-              </a:spcBef>
-              <a:spcAft>
-                <a:spcPts val="0"/>
-              </a:spcAft>
-              <a:buClrTx/>
-              <a:buSzTx/>
               <a:buFont typeface="Wingdings" panose="05000000000000000000" pitchFamily="2" charset="2"/>
               <a:buChar char="§"/>
-              <a:tabLst/>
               <a:defRPr/>
             </a:pPr>
             <a:r>
-              <a:rPr kumimoji="0" lang="en-US" sz="2400" b="0" i="0" u="none" strike="noStrike" kern="1200" cap="none" spc="0" normalizeH="0" baseline="0" noProof="0" dirty="0">
+              <a:rPr kumimoji="0" lang="en-US" sz="1600" b="0" i="0" u="none" strike="noStrike" kern="1200" cap="none" spc="0" normalizeH="0" baseline="0" noProof="0" dirty="0">
                 <a:ln>
                   <a:noFill/>
                 </a:ln>
                 <a:solidFill>
-                  <a:srgbClr val="0081E2"/>
+                  <a:srgbClr val="EB6E19"/>
                 </a:solidFill>
                 <a:effectLst/>
                 <a:uLnTx/>
                 <a:uFillTx/>
-                <a:latin typeface="Gotham Bold" pitchFamily="50" charset="0"/>
+                <a:latin typeface="Consolas" panose="020B0609020204030204" pitchFamily="49" charset="0"/>
                 <a:ea typeface="+mn-ea"/>
                 <a:cs typeface="+mn-cs"/>
               </a:rPr>
-              <a:t>Exam 1 is </a:t>
-            </a:r>
-            <a:r>
-              <a:rPr kumimoji="0" lang="en-US" sz="2400" b="0" i="0" u="none" strike="noStrike" kern="1200" cap="none" spc="0" normalizeH="0" baseline="0" noProof="0" dirty="0">
+              <a:t>Date and timings for all students </a:t>
+            </a:r>
+            <a:r>
+              <a:rPr kumimoji="0" lang="en-US" sz="1600" b="0" i="0" u="none" strike="noStrike" kern="1200" cap="none" spc="0" normalizeH="0" baseline="0" noProof="0" dirty="0">
                 <a:ln>
                   <a:noFill/>
                 </a:ln>
                 <a:solidFill>
-                  <a:srgbClr val="EB6E19"/>
+                  <a:srgbClr val="0081E2"/>
                 </a:solidFill>
                 <a:effectLst/>
                 <a:uLnTx/>
                 <a:uFillTx/>
-                <a:latin typeface="Gotham Bold" pitchFamily="50" charset="0"/>
+                <a:latin typeface="Consolas" panose="020B0609020204030204" pitchFamily="49" charset="0"/>
                 <a:ea typeface="+mn-ea"/>
                 <a:cs typeface="+mn-cs"/>
               </a:rPr>
-              <a:t>Tuesday, October 15th, 7 pm to 11 pm EST</a:t>
-            </a:r>
-            <a:endParaRPr kumimoji="0" lang="en-US" sz="2400" b="0" i="0" u="none" strike="noStrike" kern="1200" cap="none" spc="0" normalizeH="0" baseline="0" noProof="0" dirty="0">
-              <a:ln>
-                <a:noFill/>
-              </a:ln>
-              <a:solidFill>
-                <a:srgbClr val="0081E2"/>
-              </a:solidFill>
-              <a:effectLst/>
-              <a:uLnTx/>
-              <a:uFillTx/>
-              <a:latin typeface="Gotham Bold" pitchFamily="50" charset="0"/>
-              <a:ea typeface="+mn-ea"/>
-              <a:cs typeface="+mn-cs"/>
-            </a:endParaRPr>
+              <a:t>except UFOL/UDER:</a:t>
+            </a:r>
           </a:p>
           <a:p>
             <a:pPr marL="742950" lvl="1" indent="-285750">
@@ -19976,21 +19953,49 @@
               <a:defRPr/>
             </a:pPr>
             <a:r>
-              <a:rPr kumimoji="0" lang="en-US" b="0" i="0" u="none" strike="noStrike" kern="1200" cap="none" spc="0" normalizeH="0" baseline="0" noProof="0" dirty="0">
+              <a:rPr kumimoji="0" lang="en-US" sz="1600" b="0" i="0" u="none" strike="noStrike" kern="1200" cap="none" spc="0" normalizeH="0" baseline="0" noProof="0" dirty="0">
                 <a:ln>
                   <a:noFill/>
                 </a:ln>
                 <a:solidFill>
-                  <a:srgbClr val="0081E2"/>
+                  <a:srgbClr val="EB6E19"/>
                 </a:solidFill>
                 <a:effectLst/>
                 <a:uLnTx/>
                 <a:uFillTx/>
-                <a:latin typeface="Gotham Bold" pitchFamily="50" charset="0"/>
-                <a:ea typeface="+mn-ea"/>
-                <a:cs typeface="+mn-cs"/>
-              </a:rPr>
-              <a:t>The exam will be over Honorlock. </a:t>
+                <a:latin typeface="Consolas" panose="020B0609020204030204" pitchFamily="49" charset="0"/>
+              </a:rPr>
+              <a:t>The</a:t>
+            </a:r>
+            <a:r>
+              <a:rPr kumimoji="0" lang="en-US" sz="1600" b="0" i="0" u="none" strike="noStrike" kern="1200" cap="none" spc="0" normalizeH="0" baseline="0" noProof="0" dirty="0">
+                <a:ln>
+                  <a:noFill/>
+                </a:ln>
+                <a:solidFill>
+                  <a:srgbClr val="0081E2"/>
+                </a:solidFill>
+                <a:effectLst/>
+                <a:uLnTx/>
+                <a:uFillTx/>
+                <a:latin typeface="Consolas" panose="020B0609020204030204" pitchFamily="49" charset="0"/>
+              </a:rPr>
+              <a:t> </a:t>
+            </a:r>
+            <a:r>
+              <a:rPr kumimoji="0" lang="en-US" sz="1600" b="0" i="0" u="none" strike="noStrike" kern="1200" cap="none" spc="0" normalizeH="0" baseline="0" noProof="0" dirty="0">
+                <a:ln>
+                  <a:noFill/>
+                </a:ln>
+                <a:solidFill>
+                  <a:srgbClr val="EB6E19"/>
+                </a:solidFill>
+                <a:effectLst/>
+                <a:uLnTx/>
+                <a:uFillTx/>
+                <a:latin typeface="Consolas" panose="020B0609020204030204" pitchFamily="49" charset="0"/>
+              </a:rPr>
+              <a:t>exam will be via Honorlock on Tuesday, March 4, 7:30 am to 11:30 am.</a:t>
             </a:r>
           </a:p>
           <a:p>
@@ -20003,7 +20008,7 @@
               <a:defRPr/>
             </a:pPr>
             <a:r>
-              <a:rPr kumimoji="0" lang="en-US" b="0" i="0" u="none" strike="noStrike" kern="1200" cap="none" spc="0" normalizeH="0" baseline="0" noProof="0" dirty="0">
+              <a:rPr kumimoji="0" lang="en-US" sz="1600" b="0" i="0" u="none" strike="noStrike" kern="1200" cap="none" spc="0" normalizeH="0" baseline="0" noProof="0" dirty="0">
                 <a:ln>
                   <a:noFill/>
                 </a:ln>
@@ -20013,11 +20018,66 @@
                 <a:effectLst/>
                 <a:uLnTx/>
                 <a:uFillTx/>
-                <a:latin typeface="Gotham Bold" pitchFamily="50" charset="0"/>
+                <a:latin typeface="Consolas" panose="020B0609020204030204" pitchFamily="49" charset="0"/>
+              </a:rPr>
+              <a:t>You </a:t>
+            </a:r>
+            <a:r>
+              <a:rPr kumimoji="0" lang="en-US" sz="1600" b="0" i="0" u="none" strike="noStrike" kern="1200" cap="none" spc="0" normalizeH="0" baseline="0" noProof="0" dirty="0">
+                <a:ln>
+                  <a:noFill/>
+                </a:ln>
+                <a:solidFill>
+                  <a:srgbClr val="EB6E19"/>
+                </a:solidFill>
+                <a:effectLst/>
+                <a:uLnTx/>
+                <a:uFillTx/>
+                <a:latin typeface="Consolas" panose="020B0609020204030204" pitchFamily="49" charset="0"/>
+              </a:rPr>
+              <a:t>must start the exam by 9:30 am EST </a:t>
+            </a:r>
+            <a:r>
+              <a:rPr kumimoji="0" lang="en-US" sz="1600" b="0" i="0" u="none" strike="noStrike" kern="1200" cap="none" spc="0" normalizeH="0" baseline="0" noProof="0" dirty="0">
+                <a:ln>
+                  <a:noFill/>
+                </a:ln>
+                <a:solidFill>
+                  <a:srgbClr val="0081E2"/>
+                </a:solidFill>
+                <a:effectLst/>
+                <a:uLnTx/>
+                <a:uFillTx/>
+                <a:latin typeface="Consolas" panose="020B0609020204030204" pitchFamily="49" charset="0"/>
+              </a:rPr>
+              <a:t>as Canvas will throw you out at 11:30 am EST.</a:t>
+            </a:r>
+          </a:p>
+          <a:p>
+            <a:pPr marL="285750" indent="-285750">
+              <a:lnSpc>
+                <a:spcPct val="150000"/>
+              </a:lnSpc>
+              <a:buFont typeface="Wingdings" panose="05000000000000000000" pitchFamily="2" charset="2"/>
+              <a:buChar char="§"/>
+              <a:defRPr/>
+            </a:pPr>
+            <a:r>
+              <a:rPr kumimoji="0" lang="en-US" sz="1600" b="0" i="0" u="none" strike="noStrike" kern="1200" cap="none" spc="0" normalizeH="0" baseline="0" noProof="0" dirty="0">
+                <a:ln>
+                  <a:noFill/>
+                </a:ln>
+                <a:solidFill>
+                  <a:srgbClr val="0081E2"/>
+                </a:solidFill>
+                <a:effectLst/>
+                <a:uLnTx/>
+                <a:uFillTx/>
+                <a:latin typeface="Consolas" panose="020B0609020204030204" pitchFamily="49" charset="0"/>
                 <a:ea typeface="+mn-ea"/>
                 <a:cs typeface="+mn-cs"/>
               </a:rPr>
-              <a:t>The exam duration is 2 hours. </a:t>
+              <a:t>Date and timings for UFOL/UDER students:</a:t>
             </a:r>
           </a:p>
           <a:p>
@@ -20030,72 +20090,19 @@
               <a:defRPr/>
             </a:pPr>
             <a:r>
-              <a:rPr kumimoji="0" lang="en-US" b="0" i="0" u="none" strike="noStrike" kern="1200" cap="none" spc="0" normalizeH="0" baseline="0" noProof="0" dirty="0">
+              <a:rPr kumimoji="0" lang="en-US" sz="1600" b="0" i="0" u="none" strike="noStrike" kern="1200" cap="none" spc="0" normalizeH="0" baseline="0" noProof="0" dirty="0">
                 <a:ln>
                   <a:noFill/>
                 </a:ln>
                 <a:solidFill>
-                  <a:srgbClr val="EB6E19"/>
+                  <a:srgbClr val="0081E2"/>
                 </a:solidFill>
                 <a:effectLst/>
                 <a:uLnTx/>
                 <a:uFillTx/>
-                <a:latin typeface="Gotham Bold" pitchFamily="50" charset="0"/>
-                <a:ea typeface="+mn-ea"/>
-                <a:cs typeface="+mn-cs"/>
-              </a:rPr>
-              <a:t>Start</a:t>
-            </a:r>
-            <a:r>
-              <a:rPr kumimoji="0" lang="en-US" b="0" i="0" u="none" strike="noStrike" kern="1200" cap="none" spc="0" normalizeH="0" baseline="0" noProof="0" dirty="0">
-                <a:ln>
-                  <a:noFill/>
-                </a:ln>
-                <a:solidFill>
-                  <a:srgbClr val="0081E2"/>
-                </a:solidFill>
-                <a:effectLst/>
-                <a:uLnTx/>
-                <a:uFillTx/>
-                <a:latin typeface="Gotham Bold" pitchFamily="50" charset="0"/>
-                <a:ea typeface="+mn-ea"/>
-                <a:cs typeface="+mn-cs"/>
-              </a:rPr>
-              <a:t> </a:t>
-            </a:r>
-            <a:r>
-              <a:rPr kumimoji="0" lang="en-US" b="0" i="0" u="none" strike="noStrike" kern="1200" cap="none" spc="0" normalizeH="0" baseline="0" noProof="0" dirty="0">
-                <a:ln>
-                  <a:noFill/>
-                </a:ln>
-                <a:solidFill>
-                  <a:srgbClr val="EB6E19"/>
-                </a:solidFill>
-                <a:effectLst/>
-                <a:uLnTx/>
-                <a:uFillTx/>
-                <a:latin typeface="Gotham Bold" pitchFamily="50" charset="0"/>
-                <a:ea typeface="+mn-ea"/>
-                <a:cs typeface="+mn-cs"/>
-              </a:rPr>
-              <a:t>by 9 pm EST or else you will lose time</a:t>
-            </a:r>
-            <a:r>
-              <a:rPr kumimoji="0" lang="en-US" b="0" i="0" u="none" strike="noStrike" kern="1200" cap="none" spc="0" normalizeH="0" baseline="0" noProof="0" dirty="0">
-                <a:ln>
-                  <a:noFill/>
-                </a:ln>
-                <a:solidFill>
-                  <a:srgbClr val="0081E2"/>
-                </a:solidFill>
-                <a:effectLst/>
-                <a:uLnTx/>
-                <a:uFillTx/>
-                <a:latin typeface="Gotham Bold" pitchFamily="50" charset="0"/>
-                <a:ea typeface="+mn-ea"/>
-                <a:cs typeface="+mn-cs"/>
-              </a:rPr>
-              <a:t>. </a:t>
+                <a:latin typeface="Consolas" panose="020B0609020204030204" pitchFamily="49" charset="0"/>
+              </a:rPr>
+              <a:t>The exam will be via Honorlock on between March 4, 7:30 am to March 6 midnight.</a:t>
             </a:r>
           </a:p>
           <a:p>
@@ -20108,7 +20115,7 @@
               <a:defRPr/>
             </a:pPr>
             <a:r>
-              <a:rPr kumimoji="0" lang="en-US" b="0" i="0" u="none" strike="noStrike" kern="1200" cap="none" spc="0" normalizeH="0" baseline="0" noProof="0" dirty="0">
+              <a:rPr kumimoji="0" lang="en-US" sz="1600" b="0" i="0" u="none" strike="noStrike" kern="1200" cap="none" spc="0" normalizeH="0" baseline="0" noProof="0" dirty="0">
                 <a:ln>
                   <a:noFill/>
                 </a:ln>
@@ -20118,15 +20125,13 @@
                 <a:effectLst/>
                 <a:uLnTx/>
                 <a:uFillTx/>
-                <a:latin typeface="Gotham Bold" pitchFamily="50" charset="0"/>
-                <a:ea typeface="+mn-ea"/>
-                <a:cs typeface="+mn-cs"/>
-              </a:rPr>
-              <a:t>You are allowed the following for your exam:</a:t>
-            </a:r>
-          </a:p>
-          <a:p>
-            <a:pPr marL="1200150" lvl="2" indent="-285750">
+                <a:latin typeface="Consolas" panose="020B0609020204030204" pitchFamily="49" charset="0"/>
+              </a:rPr>
+              <a:t>You must start the exam by 10:00 pm EST on March 6 as Canvas will throw you out at midnight.</a:t>
+            </a:r>
+          </a:p>
+          <a:p>
+            <a:pPr marL="285750" indent="-285750">
               <a:lnSpc>
                 <a:spcPct val="150000"/>
               </a:lnSpc>
@@ -20135,7 +20140,7 @@
               <a:defRPr/>
             </a:pPr>
             <a:r>
-              <a:rPr kumimoji="0" lang="en-US" b="0" i="0" u="none" strike="noStrike" kern="1200" cap="none" spc="0" normalizeH="0" baseline="0" noProof="0" dirty="0">
+              <a:rPr kumimoji="0" lang="en-US" sz="1600" b="0" i="0" u="none" strike="noStrike" kern="1200" cap="none" spc="0" normalizeH="0" baseline="0" noProof="0" dirty="0">
                 <a:ln>
                   <a:noFill/>
                 </a:ln>
@@ -20145,15 +20150,15 @@
                 <a:effectLst/>
                 <a:uLnTx/>
                 <a:uFillTx/>
-                <a:latin typeface="Gotham Bold" pitchFamily="50" charset="0"/>
+                <a:latin typeface="Consolas" panose="020B0609020204030204" pitchFamily="49" charset="0"/>
                 <a:ea typeface="+mn-ea"/>
                 <a:cs typeface="+mn-cs"/>
               </a:rPr>
-              <a:t>one double sided handwritten sheet of notes (letter size/A4 page).</a:t>
-            </a:r>
-          </a:p>
-          <a:p>
-            <a:pPr marL="1200150" lvl="2" indent="-285750">
+              <a:t>The exam will be over Honorlock. </a:t>
+            </a:r>
+          </a:p>
+          <a:p>
+            <a:pPr marL="285750" indent="-285750">
               <a:lnSpc>
                 <a:spcPct val="150000"/>
               </a:lnSpc>
@@ -20162,7 +20167,7 @@
               <a:defRPr/>
             </a:pPr>
             <a:r>
-              <a:rPr kumimoji="0" lang="en-US" b="0" i="0" u="none" strike="noStrike" kern="1200" cap="none" spc="0" normalizeH="0" baseline="0" noProof="0" dirty="0">
+              <a:rPr kumimoji="0" lang="en-US" sz="1600" b="0" i="0" u="none" strike="noStrike" kern="1200" cap="none" spc="0" normalizeH="0" baseline="0" noProof="0" dirty="0">
                 <a:ln>
                   <a:noFill/>
                 </a:ln>
@@ -20172,9 +20177,86 @@
                 <a:effectLst/>
                 <a:uLnTx/>
                 <a:uFillTx/>
-                <a:latin typeface="Gotham Bold" pitchFamily="50" charset="0"/>
+                <a:latin typeface="Consolas" panose="020B0609020204030204" pitchFamily="49" charset="0"/>
                 <a:ea typeface="+mn-ea"/>
                 <a:cs typeface="+mn-cs"/>
+              </a:rPr>
+              <a:t>The exam duration is 2 hours. </a:t>
+            </a:r>
+          </a:p>
+          <a:p>
+            <a:pPr marL="285750" indent="-285750">
+              <a:lnSpc>
+                <a:spcPct val="150000"/>
+              </a:lnSpc>
+              <a:buFont typeface="Wingdings" panose="05000000000000000000" pitchFamily="2" charset="2"/>
+              <a:buChar char="§"/>
+              <a:defRPr/>
+            </a:pPr>
+            <a:r>
+              <a:rPr kumimoji="0" lang="en-US" sz="1600" b="0" i="0" u="none" strike="noStrike" kern="1200" cap="none" spc="0" normalizeH="0" baseline="0" noProof="0" dirty="0">
+                <a:ln>
+                  <a:noFill/>
+                </a:ln>
+                <a:solidFill>
+                  <a:srgbClr val="0081E2"/>
+                </a:solidFill>
+                <a:effectLst/>
+                <a:uLnTx/>
+                <a:uFillTx/>
+                <a:latin typeface="Consolas" panose="020B0609020204030204" pitchFamily="49" charset="0"/>
+                <a:ea typeface="+mn-ea"/>
+                <a:cs typeface="+mn-cs"/>
+              </a:rPr>
+              <a:t>You are allowed the following for your exam:</a:t>
+            </a:r>
+          </a:p>
+          <a:p>
+            <a:pPr marL="742950" lvl="1" indent="-285750">
+              <a:lnSpc>
+                <a:spcPct val="150000"/>
+              </a:lnSpc>
+              <a:buFont typeface="Wingdings" panose="05000000000000000000" pitchFamily="2" charset="2"/>
+              <a:buChar char="§"/>
+              <a:defRPr/>
+            </a:pPr>
+            <a:r>
+              <a:rPr kumimoji="0" lang="en-US" sz="1600" b="0" i="0" u="none" strike="noStrike" kern="1200" cap="none" spc="0" normalizeH="0" baseline="0" noProof="0" dirty="0">
+                <a:ln>
+                  <a:noFill/>
+                </a:ln>
+                <a:solidFill>
+                  <a:srgbClr val="0081E2"/>
+                </a:solidFill>
+                <a:effectLst/>
+                <a:uLnTx/>
+                <a:uFillTx/>
+                <a:latin typeface="Consolas" panose="020B0609020204030204" pitchFamily="49" charset="0"/>
+              </a:rPr>
+              <a:t>one double sided handwritten sheet of notes (letter size/A4 page).</a:t>
+            </a:r>
+          </a:p>
+          <a:p>
+            <a:pPr marL="742950" lvl="1" indent="-285750">
+              <a:lnSpc>
+                <a:spcPct val="150000"/>
+              </a:lnSpc>
+              <a:buFont typeface="Wingdings" panose="05000000000000000000" pitchFamily="2" charset="2"/>
+              <a:buChar char="§"/>
+              <a:defRPr/>
+            </a:pPr>
+            <a:r>
+              <a:rPr kumimoji="0" lang="en-US" sz="1600" b="0" i="0" u="none" strike="noStrike" kern="1200" cap="none" spc="0" normalizeH="0" baseline="0" noProof="0" dirty="0">
+                <a:ln>
+                  <a:noFill/>
+                </a:ln>
+                <a:solidFill>
+                  <a:srgbClr val="0081E2"/>
+                </a:solidFill>
+                <a:effectLst/>
+                <a:uLnTx/>
+                <a:uFillTx/>
+                <a:latin typeface="Consolas" panose="020B0609020204030204" pitchFamily="49" charset="0"/>
               </a:rPr>
               <a:t>6 double sided blank sheets of scratch paper (letter size/A4 page).</a:t>
             </a:r>

</xml_diff>